<commit_message>
first draft of the presention
</commit_message>
<xml_diff>
--- a/Blowfish.pptx
+++ b/Blowfish.pptx
@@ -5,17 +5,19 @@
     <p:sldMasterId id="2147483701" r:id="rId4"/>
   </p:sldMasterIdLst>
   <p:notesMasterIdLst>
-    <p:notesMasterId r:id="rId13"/>
+    <p:notesMasterId r:id="rId15"/>
   </p:notesMasterIdLst>
   <p:sldIdLst>
     <p:sldId id="257" r:id="rId5"/>
     <p:sldId id="277" r:id="rId6"/>
     <p:sldId id="279" r:id="rId7"/>
-    <p:sldId id="278" r:id="rId8"/>
-    <p:sldId id="280" r:id="rId9"/>
-    <p:sldId id="281" r:id="rId10"/>
-    <p:sldId id="282" r:id="rId11"/>
-    <p:sldId id="283" r:id="rId12"/>
+    <p:sldId id="284" r:id="rId8"/>
+    <p:sldId id="278" r:id="rId9"/>
+    <p:sldId id="280" r:id="rId10"/>
+    <p:sldId id="281" r:id="rId11"/>
+    <p:sldId id="282" r:id="rId12"/>
+    <p:sldId id="285" r:id="rId13"/>
+    <p:sldId id="283" r:id="rId14"/>
   </p:sldIdLst>
   <p:sldSz cx="12192000" cy="6858000"/>
   <p:notesSz cx="6858000" cy="9144000"/>
@@ -114,6 +116,11 @@
       </a:defRPr>
     </a:lvl9pPr>
   </p:defaultTextStyle>
+  <p:extLst>
+    <p:ext uri="{EFAFB233-063F-42B5-8137-9DF3F51BA10A}">
+      <p15:sldGuideLst xmlns:p15="http://schemas.microsoft.com/office/powerpoint/2012/main"/>
+    </p:ext>
+  </p:extLst>
 </p:presentation>
 </file>
 
@@ -207,7 +214,7 @@
           <a:p>
             <a:fld id="{5ADED4D3-2E32-4AE2-9355-559E747A8267}" type="datetimeFigureOut">
               <a:rPr lang="en-US" smtClean="0"/>
-              <a:t>5/6/2025</a:t>
+              <a:t>5/8/2025</a:t>
             </a:fld>
             <a:endParaRPr lang="en-US"/>
           </a:p>
@@ -566,6 +573,1153 @@
 </p:notes>
 </file>
 
+<file path=ppt/notesSlides/notesSlide2.xml><?xml version="1.0" encoding="utf-8"?>
+<p:notes xmlns:a="http://schemas.openxmlformats.org/drawingml/2006/main" xmlns:r="http://schemas.openxmlformats.org/officeDocument/2006/relationships" xmlns:p="http://schemas.openxmlformats.org/presentationml/2006/main">
+  <p:cSld>
+    <p:spTree>
+      <p:nvGrpSpPr>
+        <p:cNvPr id="1" name=""/>
+        <p:cNvGrpSpPr/>
+        <p:nvPr/>
+      </p:nvGrpSpPr>
+      <p:grpSpPr>
+        <a:xfrm>
+          <a:off x="0" y="0"/>
+          <a:ext cx="0" cy="0"/>
+          <a:chOff x="0" y="0"/>
+          <a:chExt cx="0" cy="0"/>
+        </a:xfrm>
+      </p:grpSpPr>
+      <p:sp>
+        <p:nvSpPr>
+          <p:cNvPr id="2" name="מציין מיקום של תמונת שקופית 1"/>
+          <p:cNvSpPr>
+            <a:spLocks noGrp="1" noRot="1" noChangeAspect="1"/>
+          </p:cNvSpPr>
+          <p:nvPr>
+            <p:ph type="sldImg"/>
+          </p:nvPr>
+        </p:nvSpPr>
+        <p:spPr/>
+      </p:sp>
+      <p:sp>
+        <p:nvSpPr>
+          <p:cNvPr id="3" name="מציין מיקום של הערות 2"/>
+          <p:cNvSpPr>
+            <a:spLocks noGrp="1"/>
+          </p:cNvSpPr>
+          <p:nvPr>
+            <p:ph type="body" idx="1"/>
+          </p:nvPr>
+        </p:nvSpPr>
+        <p:spPr/>
+        <p:txBody>
+          <a:bodyPr/>
+          <a:lstStyle/>
+          <a:p>
+            <a:pPr lvl="1">
+              <a:buFont typeface="Arial" panose="020B0604020202020204" pitchFamily="34" charset="0"/>
+              <a:buChar char="•"/>
+            </a:pPr>
+            <a:r>
+              <a:rPr lang="en-US" b="1" dirty="0"/>
+              <a:t> Blowfish</a:t>
+            </a:r>
+            <a:r>
+              <a:rPr lang="en-US" dirty="0"/>
+              <a:t> is a symmetric block cipher that encrypts data in </a:t>
+            </a:r>
+            <a:r>
+              <a:rPr lang="en-US" b="1" dirty="0"/>
+              <a:t>64-bit blocks</a:t>
+            </a:r>
+            <a:r>
+              <a:rPr lang="en-US" dirty="0"/>
+              <a:t> using a </a:t>
+            </a:r>
+            <a:r>
+              <a:rPr lang="en-US" b="1" dirty="0"/>
+              <a:t>variable-length key</a:t>
+            </a:r>
+            <a:r>
+              <a:rPr lang="en-US" dirty="0"/>
+              <a:t> (32 to 448 bits).</a:t>
+            </a:r>
+          </a:p>
+          <a:p>
+            <a:pPr lvl="1">
+              <a:buFont typeface="Arial" panose="020B0604020202020204" pitchFamily="34" charset="0"/>
+              <a:buChar char="•"/>
+            </a:pPr>
+            <a:r>
+              <a:rPr lang="en-US" dirty="0"/>
+              <a:t> Commonly used for fast, lightweight encryption.</a:t>
+            </a:r>
+          </a:p>
+          <a:p>
+            <a:pPr lvl="1">
+              <a:buFont typeface="Arial" panose="020B0604020202020204" pitchFamily="34" charset="0"/>
+              <a:buChar char="•"/>
+            </a:pPr>
+            <a:r>
+              <a:rPr lang="en-US" dirty="0"/>
+              <a:t>Operates in several modes (e.g., ECB, CBC). For email messages, CBC is more secure.</a:t>
+            </a:r>
+          </a:p>
+          <a:p>
+            <a:pPr lvl="1">
+              <a:buFont typeface="Arial" panose="020B0604020202020204" pitchFamily="34" charset="0"/>
+              <a:buChar char="•"/>
+            </a:pPr>
+            <a:r>
+              <a:rPr lang="en-US" dirty="0"/>
+              <a:t>Encryption and decryption use the </a:t>
+            </a:r>
+            <a:r>
+              <a:rPr lang="en-US" b="1" dirty="0"/>
+              <a:t>same key</a:t>
+            </a:r>
+            <a:r>
+              <a:rPr lang="en-US" dirty="0"/>
+              <a:t>, which must be shared securely.</a:t>
+            </a:r>
+          </a:p>
+          <a:p>
+            <a:endParaRPr lang="he-IL" dirty="0"/>
+          </a:p>
+        </p:txBody>
+      </p:sp>
+      <p:sp>
+        <p:nvSpPr>
+          <p:cNvPr id="4" name="מציין מיקום של מספר שקופית 3"/>
+          <p:cNvSpPr>
+            <a:spLocks noGrp="1"/>
+          </p:cNvSpPr>
+          <p:nvPr>
+            <p:ph type="sldNum" sz="quarter" idx="5"/>
+          </p:nvPr>
+        </p:nvSpPr>
+        <p:spPr/>
+        <p:txBody>
+          <a:bodyPr/>
+          <a:lstStyle/>
+          <a:p>
+            <a:fld id="{0050DDF3-CFC3-40C0-B288-2F43B4469CD4}" type="slidenum">
+              <a:rPr lang="en-US" smtClean="0"/>
+              <a:t>3</a:t>
+            </a:fld>
+            <a:endParaRPr lang="en-US"/>
+          </a:p>
+        </p:txBody>
+      </p:sp>
+    </p:spTree>
+    <p:extLst>
+      <p:ext uri="{BB962C8B-B14F-4D97-AF65-F5344CB8AC3E}">
+        <p14:creationId xmlns:p14="http://schemas.microsoft.com/office/powerpoint/2010/main" val="502466452"/>
+      </p:ext>
+    </p:extLst>
+  </p:cSld>
+  <p:clrMapOvr>
+    <a:masterClrMapping/>
+  </p:clrMapOvr>
+</p:notes>
+</file>
+
+<file path=ppt/notesSlides/notesSlide3.xml><?xml version="1.0" encoding="utf-8"?>
+<p:notes xmlns:a="http://schemas.openxmlformats.org/drawingml/2006/main" xmlns:r="http://schemas.openxmlformats.org/officeDocument/2006/relationships" xmlns:p="http://schemas.openxmlformats.org/presentationml/2006/main">
+  <p:cSld>
+    <p:spTree>
+      <p:nvGrpSpPr>
+        <p:cNvPr id="1" name=""/>
+        <p:cNvGrpSpPr/>
+        <p:nvPr/>
+      </p:nvGrpSpPr>
+      <p:grpSpPr>
+        <a:xfrm>
+          <a:off x="0" y="0"/>
+          <a:ext cx="0" cy="0"/>
+          <a:chOff x="0" y="0"/>
+          <a:chExt cx="0" cy="0"/>
+        </a:xfrm>
+      </p:grpSpPr>
+      <p:sp>
+        <p:nvSpPr>
+          <p:cNvPr id="2" name="מציין מיקום של תמונת שקופית 1"/>
+          <p:cNvSpPr>
+            <a:spLocks noGrp="1" noRot="1" noChangeAspect="1"/>
+          </p:cNvSpPr>
+          <p:nvPr>
+            <p:ph type="sldImg"/>
+          </p:nvPr>
+        </p:nvSpPr>
+        <p:spPr/>
+      </p:sp>
+      <p:sp>
+        <p:nvSpPr>
+          <p:cNvPr id="3" name="מציין מיקום של הערות 2"/>
+          <p:cNvSpPr>
+            <a:spLocks noGrp="1"/>
+          </p:cNvSpPr>
+          <p:nvPr>
+            <p:ph type="body" idx="1"/>
+          </p:nvPr>
+        </p:nvSpPr>
+        <p:spPr/>
+        <p:txBody>
+          <a:bodyPr/>
+          <a:lstStyle/>
+          <a:p>
+            <a:pPr lvl="1">
+              <a:buFont typeface="Arial" panose="020B0604020202020204" pitchFamily="34" charset="0"/>
+              <a:buChar char="•"/>
+            </a:pPr>
+            <a:r>
+              <a:rPr lang="en-US" b="1" dirty="0" err="1"/>
+              <a:t>McEliece</a:t>
+            </a:r>
+            <a:r>
+              <a:rPr lang="en-US" dirty="0"/>
+              <a:t> is a </a:t>
+            </a:r>
+            <a:r>
+              <a:rPr lang="en-US" b="1" dirty="0"/>
+              <a:t>public-key cryptosystem</a:t>
+            </a:r>
+            <a:r>
+              <a:rPr lang="en-US" dirty="0"/>
+              <a:t> based on </a:t>
+            </a:r>
+            <a:r>
+              <a:rPr lang="en-US" b="1" dirty="0"/>
+              <a:t>error-correcting codes</a:t>
+            </a:r>
+            <a:r>
+              <a:rPr lang="en-US" dirty="0"/>
+              <a:t>, not number theory — it's considered quantum-resistant.</a:t>
+            </a:r>
+          </a:p>
+          <a:p>
+            <a:pPr lvl="1">
+              <a:buFont typeface="Arial" panose="020B0604020202020204" pitchFamily="34" charset="0"/>
+              <a:buChar char="•"/>
+            </a:pPr>
+            <a:r>
+              <a:rPr lang="en-US" dirty="0"/>
+              <a:t>Used to </a:t>
+            </a:r>
+            <a:r>
+              <a:rPr lang="en-US" b="1" dirty="0"/>
+              <a:t>encrypt the symmetric Blowfish key</a:t>
+            </a:r>
+            <a:r>
+              <a:rPr lang="en-US" dirty="0"/>
+              <a:t>, so it can be sent securely.</a:t>
+            </a:r>
+          </a:p>
+          <a:p>
+            <a:pPr lvl="1">
+              <a:buFont typeface="Arial" panose="020B0604020202020204" pitchFamily="34" charset="0"/>
+              <a:buChar char="•"/>
+            </a:pPr>
+            <a:r>
+              <a:rPr lang="en-US" dirty="0"/>
+              <a:t>Only the recipient (Bob) can decrypt it using his private </a:t>
+            </a:r>
+            <a:r>
+              <a:rPr lang="en-US" dirty="0" err="1"/>
+              <a:t>McEliece</a:t>
+            </a:r>
+            <a:r>
+              <a:rPr lang="en-US" dirty="0"/>
+              <a:t> key.</a:t>
+            </a:r>
+          </a:p>
+          <a:p>
+            <a:endParaRPr lang="he-IL" dirty="0"/>
+          </a:p>
+        </p:txBody>
+      </p:sp>
+      <p:sp>
+        <p:nvSpPr>
+          <p:cNvPr id="4" name="מציין מיקום של מספר שקופית 3"/>
+          <p:cNvSpPr>
+            <a:spLocks noGrp="1"/>
+          </p:cNvSpPr>
+          <p:nvPr>
+            <p:ph type="sldNum" sz="quarter" idx="5"/>
+          </p:nvPr>
+        </p:nvSpPr>
+        <p:spPr/>
+        <p:txBody>
+          <a:bodyPr/>
+          <a:lstStyle/>
+          <a:p>
+            <a:fld id="{0050DDF3-CFC3-40C0-B288-2F43B4469CD4}" type="slidenum">
+              <a:rPr lang="en-US" smtClean="0"/>
+              <a:t>4</a:t>
+            </a:fld>
+            <a:endParaRPr lang="en-US"/>
+          </a:p>
+        </p:txBody>
+      </p:sp>
+    </p:spTree>
+    <p:extLst>
+      <p:ext uri="{BB962C8B-B14F-4D97-AF65-F5344CB8AC3E}">
+        <p14:creationId xmlns:p14="http://schemas.microsoft.com/office/powerpoint/2010/main" val="1317345622"/>
+      </p:ext>
+    </p:extLst>
+  </p:cSld>
+  <p:clrMapOvr>
+    <a:masterClrMapping/>
+  </p:clrMapOvr>
+</p:notes>
+</file>
+
+<file path=ppt/notesSlides/notesSlide4.xml><?xml version="1.0" encoding="utf-8"?>
+<p:notes xmlns:a="http://schemas.openxmlformats.org/drawingml/2006/main" xmlns:r="http://schemas.openxmlformats.org/officeDocument/2006/relationships" xmlns:p="http://schemas.openxmlformats.org/presentationml/2006/main">
+  <p:cSld>
+    <p:spTree>
+      <p:nvGrpSpPr>
+        <p:cNvPr id="1" name=""/>
+        <p:cNvGrpSpPr/>
+        <p:nvPr/>
+      </p:nvGrpSpPr>
+      <p:grpSpPr>
+        <a:xfrm>
+          <a:off x="0" y="0"/>
+          <a:ext cx="0" cy="0"/>
+          <a:chOff x="0" y="0"/>
+          <a:chExt cx="0" cy="0"/>
+        </a:xfrm>
+      </p:grpSpPr>
+      <p:sp>
+        <p:nvSpPr>
+          <p:cNvPr id="2" name="מציין מיקום של תמונת שקופית 1"/>
+          <p:cNvSpPr>
+            <a:spLocks noGrp="1" noRot="1" noChangeAspect="1"/>
+          </p:cNvSpPr>
+          <p:nvPr>
+            <p:ph type="sldImg"/>
+          </p:nvPr>
+        </p:nvSpPr>
+        <p:spPr/>
+      </p:sp>
+      <p:sp>
+        <p:nvSpPr>
+          <p:cNvPr id="3" name="מציין מיקום של הערות 2"/>
+          <p:cNvSpPr>
+            <a:spLocks noGrp="1"/>
+          </p:cNvSpPr>
+          <p:nvPr>
+            <p:ph type="body" idx="1"/>
+          </p:nvPr>
+        </p:nvSpPr>
+        <p:spPr/>
+        <p:txBody>
+          <a:bodyPr/>
+          <a:lstStyle/>
+          <a:p>
+            <a:pPr>
+              <a:buNone/>
+            </a:pPr>
+            <a:r>
+              <a:rPr lang="en-US" dirty="0"/>
+              <a:t>The original message is a plaintext string representing the content of an email. In real-world applications, this could be a subject line, a short paragraph, or any piece of text. For demonstration purposes, we use a simple text message to show how it is processed through encryption, key delivery, and digital signing.</a:t>
+            </a:r>
+          </a:p>
+          <a:p>
+            <a:r>
+              <a:rPr lang="en-US" dirty="0"/>
+              <a:t>The message must be encrypted to ensure </a:t>
+            </a:r>
+            <a:r>
+              <a:rPr lang="en-US" b="1" dirty="0"/>
+              <a:t>confidentiality</a:t>
+            </a:r>
+            <a:r>
+              <a:rPr lang="en-US" dirty="0"/>
+              <a:t>, and should be </a:t>
+            </a:r>
+            <a:r>
+              <a:rPr lang="en-US" b="1" dirty="0"/>
+              <a:t>digitally signed</a:t>
+            </a:r>
+            <a:r>
+              <a:rPr lang="en-US" dirty="0"/>
+              <a:t> to guarantee </a:t>
+            </a:r>
+            <a:r>
+              <a:rPr lang="en-US" b="1" dirty="0"/>
+              <a:t>authenticity and integrity</a:t>
+            </a:r>
+            <a:r>
+              <a:rPr lang="en-US" dirty="0"/>
+              <a:t>.</a:t>
+            </a:r>
+          </a:p>
+          <a:p>
+            <a:endParaRPr lang="he-IL" dirty="0"/>
+          </a:p>
+        </p:txBody>
+      </p:sp>
+      <p:sp>
+        <p:nvSpPr>
+          <p:cNvPr id="4" name="מציין מיקום של מספר שקופית 3"/>
+          <p:cNvSpPr>
+            <a:spLocks noGrp="1"/>
+          </p:cNvSpPr>
+          <p:nvPr>
+            <p:ph type="sldNum" sz="quarter" idx="5"/>
+          </p:nvPr>
+        </p:nvSpPr>
+        <p:spPr/>
+        <p:txBody>
+          <a:bodyPr/>
+          <a:lstStyle/>
+          <a:p>
+            <a:fld id="{0050DDF3-CFC3-40C0-B288-2F43B4469CD4}" type="slidenum">
+              <a:rPr lang="en-US" smtClean="0"/>
+              <a:t>5</a:t>
+            </a:fld>
+            <a:endParaRPr lang="en-US"/>
+          </a:p>
+        </p:txBody>
+      </p:sp>
+    </p:spTree>
+    <p:extLst>
+      <p:ext uri="{BB962C8B-B14F-4D97-AF65-F5344CB8AC3E}">
+        <p14:creationId xmlns:p14="http://schemas.microsoft.com/office/powerpoint/2010/main" val="3116880650"/>
+      </p:ext>
+    </p:extLst>
+  </p:cSld>
+  <p:clrMapOvr>
+    <a:masterClrMapping/>
+  </p:clrMapOvr>
+</p:notes>
+</file>
+
+<file path=ppt/notesSlides/notesSlide5.xml><?xml version="1.0" encoding="utf-8"?>
+<p:notes xmlns:a="http://schemas.openxmlformats.org/drawingml/2006/main" xmlns:r="http://schemas.openxmlformats.org/officeDocument/2006/relationships" xmlns:p="http://schemas.openxmlformats.org/presentationml/2006/main">
+  <p:cSld>
+    <p:spTree>
+      <p:nvGrpSpPr>
+        <p:cNvPr id="1" name=""/>
+        <p:cNvGrpSpPr/>
+        <p:nvPr/>
+      </p:nvGrpSpPr>
+      <p:grpSpPr>
+        <a:xfrm>
+          <a:off x="0" y="0"/>
+          <a:ext cx="0" cy="0"/>
+          <a:chOff x="0" y="0"/>
+          <a:chExt cx="0" cy="0"/>
+        </a:xfrm>
+      </p:grpSpPr>
+      <p:sp>
+        <p:nvSpPr>
+          <p:cNvPr id="2" name="מציין מיקום של תמונת שקופית 1"/>
+          <p:cNvSpPr>
+            <a:spLocks noGrp="1" noRot="1" noChangeAspect="1"/>
+          </p:cNvSpPr>
+          <p:nvPr>
+            <p:ph type="sldImg"/>
+          </p:nvPr>
+        </p:nvSpPr>
+        <p:spPr/>
+      </p:sp>
+      <p:sp>
+        <p:nvSpPr>
+          <p:cNvPr id="3" name="מציין מיקום של הערות 2"/>
+          <p:cNvSpPr>
+            <a:spLocks noGrp="1"/>
+          </p:cNvSpPr>
+          <p:nvPr>
+            <p:ph type="body" idx="1"/>
+          </p:nvPr>
+        </p:nvSpPr>
+        <p:spPr/>
+        <p:txBody>
+          <a:bodyPr/>
+          <a:lstStyle/>
+          <a:p>
+            <a:pPr>
+              <a:buNone/>
+            </a:pPr>
+            <a:r>
+              <a:rPr lang="en-US" dirty="0"/>
+              <a:t>Once the plaintext message is encrypted using the Blowfish symmetric cipher, the result is a </a:t>
+            </a:r>
+            <a:r>
+              <a:rPr lang="en-US" b="1" dirty="0"/>
+              <a:t>non-readable block of ciphertext</a:t>
+            </a:r>
+            <a:r>
+              <a:rPr lang="en-US" dirty="0"/>
+              <a:t>. This ciphertext appears as a random string of characters and symbols — not meaningful to anyone without the key.</a:t>
+            </a:r>
+          </a:p>
+          <a:p>
+            <a:pPr>
+              <a:buNone/>
+            </a:pPr>
+            <a:r>
+              <a:rPr lang="en-US" dirty="0"/>
+              <a:t>Encryption is done using a </a:t>
+            </a:r>
+            <a:r>
+              <a:rPr lang="en-US" b="1" dirty="0"/>
+              <a:t>randomly generated Blowfish key</a:t>
+            </a:r>
+            <a:r>
+              <a:rPr lang="en-US" dirty="0"/>
+              <a:t>, and the same key must later be used to decrypt the message. Since symmetric keys cannot be shared openly, the Blowfish key is encrypted using the </a:t>
+            </a:r>
+            <a:r>
+              <a:rPr lang="en-US" dirty="0" err="1"/>
+              <a:t>McEliece</a:t>
+            </a:r>
+            <a:r>
+              <a:rPr lang="en-US" dirty="0"/>
+              <a:t> public-key system.</a:t>
+            </a:r>
+          </a:p>
+          <a:p>
+            <a:r>
+              <a:rPr lang="en-US" dirty="0"/>
+              <a:t>This step ensures that even if someone intercepts the message, they cannot understand it without the Blowfish key — and they can't access the key unless they can break </a:t>
+            </a:r>
+            <a:r>
+              <a:rPr lang="en-US" dirty="0" err="1"/>
+              <a:t>McEliece</a:t>
+            </a:r>
+            <a:r>
+              <a:rPr lang="en-US" dirty="0"/>
+              <a:t> encryption (which is considered quantum-safe).</a:t>
+            </a:r>
+          </a:p>
+          <a:p>
+            <a:endParaRPr lang="he-IL" dirty="0"/>
+          </a:p>
+        </p:txBody>
+      </p:sp>
+      <p:sp>
+        <p:nvSpPr>
+          <p:cNvPr id="4" name="מציין מיקום של מספר שקופית 3"/>
+          <p:cNvSpPr>
+            <a:spLocks noGrp="1"/>
+          </p:cNvSpPr>
+          <p:nvPr>
+            <p:ph type="sldNum" sz="quarter" idx="5"/>
+          </p:nvPr>
+        </p:nvSpPr>
+        <p:spPr/>
+        <p:txBody>
+          <a:bodyPr/>
+          <a:lstStyle/>
+          <a:p>
+            <a:fld id="{0050DDF3-CFC3-40C0-B288-2F43B4469CD4}" type="slidenum">
+              <a:rPr lang="en-US" smtClean="0"/>
+              <a:t>6</a:t>
+            </a:fld>
+            <a:endParaRPr lang="en-US"/>
+          </a:p>
+        </p:txBody>
+      </p:sp>
+    </p:spTree>
+    <p:extLst>
+      <p:ext uri="{BB962C8B-B14F-4D97-AF65-F5344CB8AC3E}">
+        <p14:creationId xmlns:p14="http://schemas.microsoft.com/office/powerpoint/2010/main" val="550502804"/>
+      </p:ext>
+    </p:extLst>
+  </p:cSld>
+  <p:clrMapOvr>
+    <a:masterClrMapping/>
+  </p:clrMapOvr>
+</p:notes>
+</file>
+
+<file path=ppt/notesSlides/notesSlide6.xml><?xml version="1.0" encoding="utf-8"?>
+<p:notes xmlns:a="http://schemas.openxmlformats.org/drawingml/2006/main" xmlns:r="http://schemas.openxmlformats.org/officeDocument/2006/relationships" xmlns:p="http://schemas.openxmlformats.org/presentationml/2006/main">
+  <p:cSld>
+    <p:spTree>
+      <p:nvGrpSpPr>
+        <p:cNvPr id="1" name=""/>
+        <p:cNvGrpSpPr/>
+        <p:nvPr/>
+      </p:nvGrpSpPr>
+      <p:grpSpPr>
+        <a:xfrm>
+          <a:off x="0" y="0"/>
+          <a:ext cx="0" cy="0"/>
+          <a:chOff x="0" y="0"/>
+          <a:chExt cx="0" cy="0"/>
+        </a:xfrm>
+      </p:grpSpPr>
+      <p:sp>
+        <p:nvSpPr>
+          <p:cNvPr id="2" name="מציין מיקום של תמונת שקופית 1"/>
+          <p:cNvSpPr>
+            <a:spLocks noGrp="1" noRot="1" noChangeAspect="1"/>
+          </p:cNvSpPr>
+          <p:nvPr>
+            <p:ph type="sldImg"/>
+          </p:nvPr>
+        </p:nvSpPr>
+        <p:spPr/>
+      </p:sp>
+      <p:sp>
+        <p:nvSpPr>
+          <p:cNvPr id="3" name="מציין מיקום של הערות 2"/>
+          <p:cNvSpPr>
+            <a:spLocks noGrp="1"/>
+          </p:cNvSpPr>
+          <p:nvPr>
+            <p:ph type="body" idx="1"/>
+          </p:nvPr>
+        </p:nvSpPr>
+        <p:spPr/>
+        <p:txBody>
+          <a:bodyPr/>
+          <a:lstStyle/>
+          <a:p>
+            <a:pPr>
+              <a:buNone/>
+            </a:pPr>
+            <a:r>
+              <a:rPr lang="en-US" dirty="0"/>
+              <a:t>To decipher the message, the receiver (Bob) performs three critical steps:</a:t>
+            </a:r>
+          </a:p>
+          <a:p>
+            <a:pPr>
+              <a:buFont typeface="+mj-lt"/>
+              <a:buAutoNum type="arabicPeriod"/>
+            </a:pPr>
+            <a:r>
+              <a:rPr lang="en-US" b="1" dirty="0"/>
+              <a:t>Recover the Blowfish key</a:t>
+            </a:r>
+            <a:br>
+              <a:rPr lang="en-US" dirty="0"/>
+            </a:br>
+            <a:r>
+              <a:rPr lang="en-US" dirty="0"/>
+              <a:t>Using his </a:t>
+            </a:r>
+            <a:r>
+              <a:rPr lang="en-US" b="1" dirty="0"/>
+              <a:t>private </a:t>
+            </a:r>
+            <a:r>
+              <a:rPr lang="en-US" b="1" dirty="0" err="1"/>
+              <a:t>McEliece</a:t>
+            </a:r>
+            <a:r>
+              <a:rPr lang="en-US" b="1" dirty="0"/>
+              <a:t> key</a:t>
+            </a:r>
+            <a:r>
+              <a:rPr lang="en-US" dirty="0"/>
+              <a:t>, Bob decrypts the encrypted Blowfish key that was sent by Alice. Only Bob can perform this decryption, because only he possesses the correct private key.</a:t>
+            </a:r>
+          </a:p>
+          <a:p>
+            <a:pPr>
+              <a:buFont typeface="+mj-lt"/>
+              <a:buAutoNum type="arabicPeriod"/>
+            </a:pPr>
+            <a:r>
+              <a:rPr lang="en-US" b="1" dirty="0"/>
+              <a:t>Decrypt the message</a:t>
+            </a:r>
+            <a:br>
+              <a:rPr lang="en-US" dirty="0"/>
+            </a:br>
+            <a:r>
+              <a:rPr lang="en-US" dirty="0"/>
+              <a:t>With the recovered Blowfish key, Bob decrypts the ciphertext. Blowfish is symmetric, so the same key used for encryption is now used for decryption.</a:t>
+            </a:r>
+          </a:p>
+          <a:p>
+            <a:pPr>
+              <a:buFont typeface="+mj-lt"/>
+              <a:buAutoNum type="arabicPeriod"/>
+            </a:pPr>
+            <a:r>
+              <a:rPr lang="en-US" b="1" dirty="0"/>
+              <a:t>Verify the signature</a:t>
+            </a:r>
+            <a:br>
+              <a:rPr lang="en-US" dirty="0"/>
+            </a:br>
+            <a:r>
+              <a:rPr lang="en-US" dirty="0"/>
+              <a:t>Before trusting the decrypted content, Bob verifies the digital signature using Alice’s public ECDSA key. This ensures that:</a:t>
+            </a:r>
+          </a:p>
+          <a:p>
+            <a:pPr marL="742950" lvl="1" indent="-285750">
+              <a:buFont typeface="+mj-lt"/>
+              <a:buAutoNum type="arabicPeriod"/>
+            </a:pPr>
+            <a:r>
+              <a:rPr lang="en-US" dirty="0"/>
+              <a:t>The message truly came from Alice (authenticity)</a:t>
+            </a:r>
+          </a:p>
+          <a:p>
+            <a:pPr marL="742950" lvl="1" indent="-285750">
+              <a:buFont typeface="+mj-lt"/>
+              <a:buAutoNum type="arabicPeriod"/>
+            </a:pPr>
+            <a:r>
+              <a:rPr lang="en-US" dirty="0"/>
+              <a:t>The message has not been altered (integrity)</a:t>
+            </a:r>
+          </a:p>
+          <a:p>
+            <a:r>
+              <a:rPr lang="en-US" dirty="0"/>
+              <a:t>Only if the signature is valid does Bob consider the message trustworthy.</a:t>
+            </a:r>
+          </a:p>
+          <a:p>
+            <a:endParaRPr lang="he-IL" dirty="0"/>
+          </a:p>
+        </p:txBody>
+      </p:sp>
+      <p:sp>
+        <p:nvSpPr>
+          <p:cNvPr id="4" name="מציין מיקום של מספר שקופית 3"/>
+          <p:cNvSpPr>
+            <a:spLocks noGrp="1"/>
+          </p:cNvSpPr>
+          <p:nvPr>
+            <p:ph type="sldNum" sz="quarter" idx="5"/>
+          </p:nvPr>
+        </p:nvSpPr>
+        <p:spPr/>
+        <p:txBody>
+          <a:bodyPr/>
+          <a:lstStyle/>
+          <a:p>
+            <a:fld id="{0050DDF3-CFC3-40C0-B288-2F43B4469CD4}" type="slidenum">
+              <a:rPr lang="en-US" smtClean="0"/>
+              <a:t>7</a:t>
+            </a:fld>
+            <a:endParaRPr lang="en-US"/>
+          </a:p>
+        </p:txBody>
+      </p:sp>
+    </p:spTree>
+    <p:extLst>
+      <p:ext uri="{BB962C8B-B14F-4D97-AF65-F5344CB8AC3E}">
+        <p14:creationId xmlns:p14="http://schemas.microsoft.com/office/powerpoint/2010/main" val="58447891"/>
+      </p:ext>
+    </p:extLst>
+  </p:cSld>
+  <p:clrMapOvr>
+    <a:masterClrMapping/>
+  </p:clrMapOvr>
+</p:notes>
+</file>
+
+<file path=ppt/notesSlides/notesSlide7.xml><?xml version="1.0" encoding="utf-8"?>
+<p:notes xmlns:a="http://schemas.openxmlformats.org/drawingml/2006/main" xmlns:r="http://schemas.openxmlformats.org/officeDocument/2006/relationships" xmlns:p="http://schemas.openxmlformats.org/presentationml/2006/main">
+  <p:cSld>
+    <p:spTree>
+      <p:nvGrpSpPr>
+        <p:cNvPr id="1" name=""/>
+        <p:cNvGrpSpPr/>
+        <p:nvPr/>
+      </p:nvGrpSpPr>
+      <p:grpSpPr>
+        <a:xfrm>
+          <a:off x="0" y="0"/>
+          <a:ext cx="0" cy="0"/>
+          <a:chOff x="0" y="0"/>
+          <a:chExt cx="0" cy="0"/>
+        </a:xfrm>
+      </p:grpSpPr>
+      <p:sp>
+        <p:nvSpPr>
+          <p:cNvPr id="2" name="מציין מיקום של תמונת שקופית 1"/>
+          <p:cNvSpPr>
+            <a:spLocks noGrp="1" noRot="1" noChangeAspect="1"/>
+          </p:cNvSpPr>
+          <p:nvPr>
+            <p:ph type="sldImg"/>
+          </p:nvPr>
+        </p:nvSpPr>
+        <p:spPr/>
+      </p:sp>
+      <p:sp>
+        <p:nvSpPr>
+          <p:cNvPr id="3" name="מציין מיקום של הערות 2"/>
+          <p:cNvSpPr>
+            <a:spLocks noGrp="1"/>
+          </p:cNvSpPr>
+          <p:nvPr>
+            <p:ph type="body" idx="1"/>
+          </p:nvPr>
+        </p:nvSpPr>
+        <p:spPr/>
+        <p:txBody>
+          <a:bodyPr/>
+          <a:lstStyle/>
+          <a:p>
+            <a:pPr>
+              <a:buNone/>
+            </a:pPr>
+            <a:r>
+              <a:rPr lang="en-US" dirty="0"/>
+              <a:t>Digital signatures are used in our system to make sure that:</a:t>
+            </a:r>
+          </a:p>
+          <a:p>
+            <a:pPr>
+              <a:buFont typeface="Arial" panose="020B0604020202020204" pitchFamily="34" charset="0"/>
+              <a:buChar char="•"/>
+            </a:pPr>
+            <a:r>
+              <a:rPr lang="en-US" dirty="0"/>
+              <a:t>The message truly came from the sender (Alice)</a:t>
+            </a:r>
+          </a:p>
+          <a:p>
+            <a:pPr>
+              <a:buFont typeface="Arial" panose="020B0604020202020204" pitchFamily="34" charset="0"/>
+              <a:buChar char="•"/>
+            </a:pPr>
+            <a:r>
+              <a:rPr lang="en-US" dirty="0"/>
+              <a:t>The encrypted message has not been tampered with</a:t>
+            </a:r>
+          </a:p>
+          <a:p>
+            <a:r>
+              <a:rPr lang="en-US" dirty="0"/>
+              <a:t>The signature is added after encryption, and verified before decryption, using public-key cryptography.</a:t>
+            </a:r>
+            <a:br>
+              <a:rPr lang="en-US" dirty="0"/>
+            </a:br>
+            <a:r>
+              <a:rPr lang="en-US"/>
+              <a:t>Details of how the signing works will be covered in the next slide: </a:t>
+            </a:r>
+            <a:r>
+              <a:rPr lang="en-US" b="1"/>
+              <a:t>“How ECDSA Works.”</a:t>
+            </a:r>
+            <a:endParaRPr lang="en-US"/>
+          </a:p>
+        </p:txBody>
+      </p:sp>
+      <p:sp>
+        <p:nvSpPr>
+          <p:cNvPr id="4" name="מציין מיקום של מספר שקופית 3"/>
+          <p:cNvSpPr>
+            <a:spLocks noGrp="1"/>
+          </p:cNvSpPr>
+          <p:nvPr>
+            <p:ph type="sldNum" sz="quarter" idx="5"/>
+          </p:nvPr>
+        </p:nvSpPr>
+        <p:spPr/>
+        <p:txBody>
+          <a:bodyPr/>
+          <a:lstStyle/>
+          <a:p>
+            <a:fld id="{0050DDF3-CFC3-40C0-B288-2F43B4469CD4}" type="slidenum">
+              <a:rPr lang="en-US" smtClean="0"/>
+              <a:t>8</a:t>
+            </a:fld>
+            <a:endParaRPr lang="en-US"/>
+          </a:p>
+        </p:txBody>
+      </p:sp>
+    </p:spTree>
+    <p:extLst>
+      <p:ext uri="{BB962C8B-B14F-4D97-AF65-F5344CB8AC3E}">
+        <p14:creationId xmlns:p14="http://schemas.microsoft.com/office/powerpoint/2010/main" val="2598733232"/>
+      </p:ext>
+    </p:extLst>
+  </p:cSld>
+  <p:clrMapOvr>
+    <a:masterClrMapping/>
+  </p:clrMapOvr>
+</p:notes>
+</file>
+
+<file path=ppt/notesSlides/notesSlide8.xml><?xml version="1.0" encoding="utf-8"?>
+<p:notes xmlns:a="http://schemas.openxmlformats.org/drawingml/2006/main" xmlns:r="http://schemas.openxmlformats.org/officeDocument/2006/relationships" xmlns:p="http://schemas.openxmlformats.org/presentationml/2006/main">
+  <p:cSld>
+    <p:spTree>
+      <p:nvGrpSpPr>
+        <p:cNvPr id="1" name="">
+          <a:extLst>
+            <a:ext uri="{FF2B5EF4-FFF2-40B4-BE49-F238E27FC236}">
+              <a16:creationId xmlns:a16="http://schemas.microsoft.com/office/drawing/2014/main" id="{6FD23188-647C-1082-BE6C-BC25BE491884}"/>
+            </a:ext>
+          </a:extLst>
+        </p:cNvPr>
+        <p:cNvGrpSpPr/>
+        <p:nvPr/>
+      </p:nvGrpSpPr>
+      <p:grpSpPr>
+        <a:xfrm>
+          <a:off x="0" y="0"/>
+          <a:ext cx="0" cy="0"/>
+          <a:chOff x="0" y="0"/>
+          <a:chExt cx="0" cy="0"/>
+        </a:xfrm>
+      </p:grpSpPr>
+      <p:sp>
+        <p:nvSpPr>
+          <p:cNvPr id="2" name="מציין מיקום של תמונת שקופית 1">
+            <a:extLst>
+              <a:ext uri="{FF2B5EF4-FFF2-40B4-BE49-F238E27FC236}">
+                <a16:creationId xmlns:a16="http://schemas.microsoft.com/office/drawing/2014/main" id="{11720367-054E-7654-A388-0FFF1248E2D2}"/>
+              </a:ext>
+            </a:extLst>
+          </p:cNvPr>
+          <p:cNvSpPr>
+            <a:spLocks noGrp="1" noRot="1" noChangeAspect="1"/>
+          </p:cNvSpPr>
+          <p:nvPr>
+            <p:ph type="sldImg"/>
+          </p:nvPr>
+        </p:nvSpPr>
+        <p:spPr/>
+      </p:sp>
+      <p:sp>
+        <p:nvSpPr>
+          <p:cNvPr id="3" name="מציין מיקום של הערות 2">
+            <a:extLst>
+              <a:ext uri="{FF2B5EF4-FFF2-40B4-BE49-F238E27FC236}">
+                <a16:creationId xmlns:a16="http://schemas.microsoft.com/office/drawing/2014/main" id="{12BAD80A-5546-C50F-C527-A46064F7EDA1}"/>
+              </a:ext>
+            </a:extLst>
+          </p:cNvPr>
+          <p:cNvSpPr>
+            <a:spLocks noGrp="1"/>
+          </p:cNvSpPr>
+          <p:nvPr>
+            <p:ph type="body" idx="1"/>
+          </p:nvPr>
+        </p:nvSpPr>
+        <p:spPr/>
+        <p:txBody>
+          <a:bodyPr/>
+          <a:lstStyle/>
+          <a:p>
+            <a:pPr>
+              <a:buNone/>
+            </a:pPr>
+            <a:r>
+              <a:rPr lang="en-US" b="1" dirty="0"/>
+              <a:t>ECDSA (Elliptic Curve Digital Signature Algorithm)</a:t>
+            </a:r>
+            <a:r>
+              <a:rPr lang="en-US" dirty="0"/>
+              <a:t> is a digital signature scheme based on the mathematics of elliptic curves.</a:t>
+            </a:r>
+          </a:p>
+          <a:p>
+            <a:pPr>
+              <a:buNone/>
+            </a:pPr>
+            <a:r>
+              <a:rPr lang="en-US" b="1" dirty="0"/>
+              <a:t>Step 1: Signing (by Alice)</a:t>
+            </a:r>
+            <a:endParaRPr lang="en-US" dirty="0"/>
+          </a:p>
+          <a:p>
+            <a:pPr>
+              <a:buFont typeface="Arial" panose="020B0604020202020204" pitchFamily="34" charset="0"/>
+              <a:buChar char="•"/>
+            </a:pPr>
+            <a:r>
+              <a:rPr lang="en-US" dirty="0"/>
+              <a:t>Alice hashes the encrypted message (e.g., with SHA-256)</a:t>
+            </a:r>
+          </a:p>
+          <a:p>
+            <a:pPr>
+              <a:buFont typeface="Arial" panose="020B0604020202020204" pitchFamily="34" charset="0"/>
+              <a:buChar char="•"/>
+            </a:pPr>
+            <a:r>
+              <a:rPr lang="en-US" dirty="0"/>
+              <a:t>She uses her </a:t>
+            </a:r>
+            <a:r>
+              <a:rPr lang="en-US" b="1" dirty="0"/>
+              <a:t>private key</a:t>
+            </a:r>
+            <a:r>
+              <a:rPr lang="en-US" dirty="0"/>
+              <a:t> and the hash to generate a digital signature — typically a pair of numbers (r, s)</a:t>
+            </a:r>
+          </a:p>
+          <a:p>
+            <a:pPr>
+              <a:buFont typeface="Arial" panose="020B0604020202020204" pitchFamily="34" charset="0"/>
+              <a:buChar char="•"/>
+            </a:pPr>
+            <a:r>
+              <a:rPr lang="en-US" dirty="0"/>
+              <a:t>She sends the encrypted message, the signature (r, s), and her </a:t>
+            </a:r>
+            <a:r>
+              <a:rPr lang="en-US" b="1" dirty="0"/>
+              <a:t>public key</a:t>
+            </a:r>
+            <a:endParaRPr lang="en-US" dirty="0"/>
+          </a:p>
+          <a:p>
+            <a:pPr>
+              <a:buNone/>
+            </a:pPr>
+            <a:r>
+              <a:rPr lang="en-US" b="1" dirty="0"/>
+              <a:t>Step 2: Verification (by Bob)</a:t>
+            </a:r>
+            <a:endParaRPr lang="en-US" dirty="0"/>
+          </a:p>
+          <a:p>
+            <a:pPr>
+              <a:buFont typeface="Arial" panose="020B0604020202020204" pitchFamily="34" charset="0"/>
+              <a:buChar char="•"/>
+            </a:pPr>
+            <a:r>
+              <a:rPr lang="en-US" dirty="0"/>
+              <a:t>Bob receives the signature and message</a:t>
+            </a:r>
+          </a:p>
+          <a:p>
+            <a:pPr>
+              <a:buFont typeface="Arial" panose="020B0604020202020204" pitchFamily="34" charset="0"/>
+              <a:buChar char="•"/>
+            </a:pPr>
+            <a:r>
+              <a:rPr lang="en-US" dirty="0"/>
+              <a:t>He also hashes the received message</a:t>
+            </a:r>
+          </a:p>
+          <a:p>
+            <a:pPr>
+              <a:buFont typeface="Arial" panose="020B0604020202020204" pitchFamily="34" charset="0"/>
+              <a:buChar char="•"/>
+            </a:pPr>
+            <a:r>
+              <a:rPr lang="en-US" dirty="0"/>
+              <a:t>Using Alice’s </a:t>
+            </a:r>
+            <a:r>
+              <a:rPr lang="en-US" b="1" dirty="0"/>
+              <a:t>public key</a:t>
+            </a:r>
+            <a:r>
+              <a:rPr lang="en-US" dirty="0"/>
+              <a:t>, he verifies if the signature corresponds to that hash</a:t>
+            </a:r>
+          </a:p>
+          <a:p>
+            <a:pPr>
+              <a:buNone/>
+            </a:pPr>
+            <a:r>
+              <a:rPr lang="en-US" dirty="0"/>
+              <a:t>If it matches, Bob knows:</a:t>
+            </a:r>
+          </a:p>
+          <a:p>
+            <a:pPr>
+              <a:buFont typeface="Arial" panose="020B0604020202020204" pitchFamily="34" charset="0"/>
+              <a:buChar char="•"/>
+            </a:pPr>
+            <a:r>
+              <a:rPr lang="en-US" dirty="0"/>
+              <a:t>The message really came from Alice (authenticity)</a:t>
+            </a:r>
+          </a:p>
+          <a:p>
+            <a:pPr>
+              <a:buFont typeface="Arial" panose="020B0604020202020204" pitchFamily="34" charset="0"/>
+              <a:buChar char="•"/>
+            </a:pPr>
+            <a:r>
+              <a:rPr lang="en-US" dirty="0"/>
+              <a:t>The message was not altered in transit (integrity)</a:t>
+            </a:r>
+          </a:p>
+          <a:p>
+            <a:pPr>
+              <a:buNone/>
+            </a:pPr>
+            <a:r>
+              <a:rPr lang="en-US" b="1" dirty="0"/>
+              <a:t>Why elliptic curves?</a:t>
+            </a:r>
+            <a:endParaRPr lang="en-US" dirty="0"/>
+          </a:p>
+          <a:p>
+            <a:pPr>
+              <a:buFont typeface="Arial" panose="020B0604020202020204" pitchFamily="34" charset="0"/>
+              <a:buChar char="•"/>
+            </a:pPr>
+            <a:r>
+              <a:rPr lang="en-US" dirty="0"/>
+              <a:t>Strong security with smaller keys (e.g., 256-bit ECC key ≈ 3072-bit RSA key)</a:t>
+            </a:r>
+          </a:p>
+        </p:txBody>
+      </p:sp>
+      <p:sp>
+        <p:nvSpPr>
+          <p:cNvPr id="4" name="מציין מיקום של מספר שקופית 3">
+            <a:extLst>
+              <a:ext uri="{FF2B5EF4-FFF2-40B4-BE49-F238E27FC236}">
+                <a16:creationId xmlns:a16="http://schemas.microsoft.com/office/drawing/2014/main" id="{9F38BC72-247F-24CD-4B00-04C16FA26DBA}"/>
+              </a:ext>
+            </a:extLst>
+          </p:cNvPr>
+          <p:cNvSpPr>
+            <a:spLocks noGrp="1"/>
+          </p:cNvSpPr>
+          <p:nvPr>
+            <p:ph type="sldNum" sz="quarter" idx="5"/>
+          </p:nvPr>
+        </p:nvSpPr>
+        <p:spPr/>
+        <p:txBody>
+          <a:bodyPr/>
+          <a:lstStyle/>
+          <a:p>
+            <a:fld id="{0050DDF3-CFC3-40C0-B288-2F43B4469CD4}" type="slidenum">
+              <a:rPr lang="en-US" smtClean="0"/>
+              <a:t>9</a:t>
+            </a:fld>
+            <a:endParaRPr lang="en-US"/>
+          </a:p>
+        </p:txBody>
+      </p:sp>
+    </p:spTree>
+    <p:extLst>
+      <p:ext uri="{BB962C8B-B14F-4D97-AF65-F5344CB8AC3E}">
+        <p14:creationId xmlns:p14="http://schemas.microsoft.com/office/powerpoint/2010/main" val="4107322695"/>
+      </p:ext>
+    </p:extLst>
+  </p:cSld>
+  <p:clrMapOvr>
+    <a:masterClrMapping/>
+  </p:clrMapOvr>
+</p:notes>
+</file>
+
 <file path=ppt/slideLayouts/slideLayout1.xml><?xml version="1.0" encoding="utf-8"?>
 <p:sldLayout xmlns:a="http://schemas.openxmlformats.org/drawingml/2006/main" xmlns:r="http://schemas.openxmlformats.org/officeDocument/2006/relationships" xmlns:p="http://schemas.openxmlformats.org/presentationml/2006/main" showMasterSp="0" type="title" preserve="1">
   <p:cSld name="Title Slide">
@@ -794,7 +1948,7 @@
           <a:p>
             <a:fld id="{8AFF2A1E-1F13-4D95-B202-10B7563D4805}" type="datetimeFigureOut">
               <a:rPr lang="en-US" smtClean="0"/>
-              <a:t>5/6/2025</a:t>
+              <a:t>5/8/2025</a:t>
             </a:fld>
             <a:endParaRPr lang="en-US"/>
           </a:p>
@@ -1002,7 +2156,7 @@
           <a:p>
             <a:fld id="{8AFF2A1E-1F13-4D95-B202-10B7563D4805}" type="datetimeFigureOut">
               <a:rPr lang="en-US" smtClean="0"/>
-              <a:t>5/6/2025</a:t>
+              <a:t>5/8/2025</a:t>
             </a:fld>
             <a:endParaRPr lang="en-US"/>
           </a:p>
@@ -1260,7 +2414,7 @@
           <a:p>
             <a:fld id="{8AFF2A1E-1F13-4D95-B202-10B7563D4805}" type="datetimeFigureOut">
               <a:rPr lang="en-US" smtClean="0"/>
-              <a:t>5/6/2025</a:t>
+              <a:t>5/8/2025</a:t>
             </a:fld>
             <a:endParaRPr lang="en-US"/>
           </a:p>
@@ -1430,7 +2584,7 @@
           <a:p>
             <a:fld id="{8AFF2A1E-1F13-4D95-B202-10B7563D4805}" type="datetimeFigureOut">
               <a:rPr lang="en-US" smtClean="0"/>
-              <a:t>5/6/2025</a:t>
+              <a:t>5/8/2025</a:t>
             </a:fld>
             <a:endParaRPr lang="en-US"/>
           </a:p>
@@ -1767,7 +2921,7 @@
           <a:p>
             <a:fld id="{8AFF2A1E-1F13-4D95-B202-10B7563D4805}" type="datetimeFigureOut">
               <a:rPr lang="en-US" smtClean="0"/>
-              <a:t>5/6/2025</a:t>
+              <a:t>5/8/2025</a:t>
             </a:fld>
             <a:endParaRPr lang="en-US"/>
           </a:p>
@@ -2042,7 +3196,7 @@
           <a:p>
             <a:fld id="{8AFF2A1E-1F13-4D95-B202-10B7563D4805}" type="datetimeFigureOut">
               <a:rPr lang="en-US" smtClean="0"/>
-              <a:t>5/6/2025</a:t>
+              <a:t>5/8/2025</a:t>
             </a:fld>
             <a:endParaRPr lang="en-US"/>
           </a:p>
@@ -2421,7 +3575,7 @@
           <a:p>
             <a:fld id="{8AFF2A1E-1F13-4D95-B202-10B7563D4805}" type="datetimeFigureOut">
               <a:rPr lang="en-US" smtClean="0"/>
-              <a:t>5/6/2025</a:t>
+              <a:t>5/8/2025</a:t>
             </a:fld>
             <a:endParaRPr lang="en-US"/>
           </a:p>
@@ -2539,7 +3693,7 @@
           <a:p>
             <a:fld id="{8AFF2A1E-1F13-4D95-B202-10B7563D4805}" type="datetimeFigureOut">
               <a:rPr lang="en-US" smtClean="0"/>
-              <a:t>5/6/2025</a:t>
+              <a:t>5/8/2025</a:t>
             </a:fld>
             <a:endParaRPr lang="en-US"/>
           </a:p>
@@ -2712,7 +3866,7 @@
           <a:p>
             <a:fld id="{8AFF2A1E-1F13-4D95-B202-10B7563D4805}" type="datetimeFigureOut">
               <a:rPr lang="en-US" smtClean="0"/>
-              <a:t>5/6/2025</a:t>
+              <a:t>5/8/2025</a:t>
             </a:fld>
             <a:endParaRPr lang="en-US"/>
           </a:p>
@@ -3068,7 +4222,7 @@
           <a:p>
             <a:fld id="{8AFF2A1E-1F13-4D95-B202-10B7563D4805}" type="datetimeFigureOut">
               <a:rPr lang="en-US" smtClean="0"/>
-              <a:t>5/6/2025</a:t>
+              <a:t>5/8/2025</a:t>
             </a:fld>
             <a:endParaRPr lang="en-US"/>
           </a:p>
@@ -3447,7 +4601,7 @@
           <a:p>
             <a:fld id="{8AFF2A1E-1F13-4D95-B202-10B7563D4805}" type="datetimeFigureOut">
               <a:rPr lang="en-US" smtClean="0"/>
-              <a:t>5/6/2025</a:t>
+              <a:t>5/8/2025</a:t>
             </a:fld>
             <a:endParaRPr lang="en-US"/>
           </a:p>
@@ -3736,7 +4890,7 @@
           <a:p>
             <a:fld id="{8AFF2A1E-1F13-4D95-B202-10B7563D4805}" type="datetimeFigureOut">
               <a:rPr lang="en-US" smtClean="0"/>
-              <a:t>5/6/2025</a:t>
+              <a:t>5/8/2025</a:t>
             </a:fld>
             <a:endParaRPr lang="en-US"/>
           </a:p>
@@ -4392,6 +5546,89 @@
 </p:sld>
 </file>
 
+<file path=ppt/slides/slide10.xml><?xml version="1.0" encoding="utf-8"?>
+<p:sld xmlns:a="http://schemas.openxmlformats.org/drawingml/2006/main" xmlns:r="http://schemas.openxmlformats.org/officeDocument/2006/relationships" xmlns:p="http://schemas.openxmlformats.org/presentationml/2006/main">
+  <p:cSld>
+    <p:spTree>
+      <p:nvGrpSpPr>
+        <p:cNvPr id="1" name=""/>
+        <p:cNvGrpSpPr/>
+        <p:nvPr/>
+      </p:nvGrpSpPr>
+      <p:grpSpPr>
+        <a:xfrm>
+          <a:off x="0" y="0"/>
+          <a:ext cx="0" cy="0"/>
+          <a:chOff x="0" y="0"/>
+          <a:chExt cx="0" cy="0"/>
+        </a:xfrm>
+      </p:grpSpPr>
+      <p:sp>
+        <p:nvSpPr>
+          <p:cNvPr id="2" name="Title 1">
+            <a:extLst>
+              <a:ext uri="{FF2B5EF4-FFF2-40B4-BE49-F238E27FC236}">
+                <a16:creationId xmlns:a16="http://schemas.microsoft.com/office/drawing/2014/main" id="{47F36288-342E-EA10-AA37-F42658EB062E}"/>
+              </a:ext>
+            </a:extLst>
+          </p:cNvPr>
+          <p:cNvSpPr>
+            <a:spLocks noGrp="1"/>
+          </p:cNvSpPr>
+          <p:nvPr>
+            <p:ph type="title"/>
+          </p:nvPr>
+        </p:nvSpPr>
+        <p:spPr/>
+        <p:txBody>
+          <a:bodyPr/>
+          <a:lstStyle/>
+          <a:p>
+            <a:r>
+              <a:rPr lang="en-US" dirty="0"/>
+              <a:t>Hash Function</a:t>
+            </a:r>
+          </a:p>
+        </p:txBody>
+      </p:sp>
+      <p:sp>
+        <p:nvSpPr>
+          <p:cNvPr id="3" name="Content Placeholder 2">
+            <a:extLst>
+              <a:ext uri="{FF2B5EF4-FFF2-40B4-BE49-F238E27FC236}">
+                <a16:creationId xmlns:a16="http://schemas.microsoft.com/office/drawing/2014/main" id="{4A87D67E-2A13-CFBE-7FA0-777A7BA2D861}"/>
+              </a:ext>
+            </a:extLst>
+          </p:cNvPr>
+          <p:cNvSpPr>
+            <a:spLocks noGrp="1"/>
+          </p:cNvSpPr>
+          <p:nvPr>
+            <p:ph idx="1"/>
+          </p:nvPr>
+        </p:nvSpPr>
+        <p:spPr/>
+        <p:txBody>
+          <a:bodyPr/>
+          <a:lstStyle/>
+          <a:p>
+            <a:endParaRPr lang="en-US"/>
+          </a:p>
+        </p:txBody>
+      </p:sp>
+    </p:spTree>
+    <p:extLst>
+      <p:ext uri="{BB962C8B-B14F-4D97-AF65-F5344CB8AC3E}">
+        <p14:creationId xmlns:p14="http://schemas.microsoft.com/office/powerpoint/2010/main" val="2492103625"/>
+      </p:ext>
+    </p:extLst>
+  </p:cSld>
+  <p:clrMapOvr>
+    <a:masterClrMapping/>
+  </p:clrMapOvr>
+</p:sld>
+</file>
+
 <file path=ppt/slides/slide2.xml><?xml version="1.0" encoding="utf-8"?>
 <p:sld xmlns:a="http://schemas.openxmlformats.org/drawingml/2006/main" xmlns:r="http://schemas.openxmlformats.org/officeDocument/2006/relationships" xmlns:p="http://schemas.openxmlformats.org/presentationml/2006/main">
   <p:cSld>
@@ -5226,10 +6463,76 @@
         </p:nvSpPr>
         <p:spPr/>
         <p:txBody>
-          <a:bodyPr/>
+          <a:bodyPr>
+            <a:normAutofit/>
+          </a:bodyPr>
           <a:lstStyle/>
           <a:p>
-            <a:endParaRPr lang="en-US"/>
+            <a:r>
+              <a:rPr lang="en-US" dirty="0"/>
+              <a:t>Symmetric Encryption – Blowfish</a:t>
+            </a:r>
+          </a:p>
+          <a:p>
+            <a:endParaRPr lang="en-US" dirty="0"/>
+          </a:p>
+          <a:p>
+            <a:pPr lvl="1">
+              <a:buFont typeface="Arial" panose="020B0604020202020204" pitchFamily="34" charset="0"/>
+              <a:buChar char="•"/>
+            </a:pPr>
+            <a:r>
+              <a:rPr lang="en-US" dirty="0"/>
+              <a:t>Block cipher: 64-bit block size</a:t>
+            </a:r>
+          </a:p>
+          <a:p>
+            <a:pPr lvl="1">
+              <a:buFont typeface="Arial" panose="020B0604020202020204" pitchFamily="34" charset="0"/>
+              <a:buChar char="•"/>
+            </a:pPr>
+            <a:r>
+              <a:rPr lang="en-US" dirty="0"/>
+              <a:t>Key size: 32 to 448 bits (typically 128 or 256 bits)</a:t>
+            </a:r>
+          </a:p>
+          <a:p>
+            <a:pPr lvl="1">
+              <a:buFont typeface="Arial" panose="020B0604020202020204" pitchFamily="34" charset="0"/>
+              <a:buChar char="•"/>
+            </a:pPr>
+            <a:r>
+              <a:rPr lang="en-US" dirty="0"/>
+              <a:t>Fast and lightweight – suitable for message encryption</a:t>
+            </a:r>
+          </a:p>
+          <a:p>
+            <a:pPr lvl="1">
+              <a:buFont typeface="Arial" panose="020B0604020202020204" pitchFamily="34" charset="0"/>
+              <a:buChar char="•"/>
+            </a:pPr>
+            <a:r>
+              <a:rPr lang="en-US" dirty="0"/>
+              <a:t>Same key used for encryption and decryption (symmetric)</a:t>
+            </a:r>
+          </a:p>
+          <a:p>
+            <a:pPr lvl="1">
+              <a:buFont typeface="Arial" panose="020B0604020202020204" pitchFamily="34" charset="0"/>
+              <a:buChar char="•"/>
+            </a:pPr>
+            <a:r>
+              <a:rPr lang="en-US" dirty="0"/>
+              <a:t>Requires secure key exchange → handled by </a:t>
+            </a:r>
+            <a:r>
+              <a:rPr lang="en-US" dirty="0" err="1"/>
+              <a:t>McEliece</a:t>
+            </a:r>
+            <a:endParaRPr lang="en-US" dirty="0"/>
+          </a:p>
+          <a:p>
+            <a:endParaRPr lang="en-US" dirty="0"/>
           </a:p>
         </p:txBody>
       </p:sp>
@@ -5251,7 +6554,13 @@
   <p:cSld>
     <p:spTree>
       <p:nvGrpSpPr>
-        <p:cNvPr id="1" name=""/>
+        <p:cNvPr id="1" name="">
+          <a:extLst>
+            <a:ext uri="{FF2B5EF4-FFF2-40B4-BE49-F238E27FC236}">
+              <a16:creationId xmlns:a16="http://schemas.microsoft.com/office/drawing/2014/main" id="{3FBB8747-A118-41C8-62FD-D99BBF41F767}"/>
+            </a:ext>
+          </a:extLst>
+        </p:cNvPr>
         <p:cNvGrpSpPr/>
         <p:nvPr/>
       </p:nvGrpSpPr>
@@ -5268,7 +6577,7 @@
           <p:cNvPr id="2" name="Title 1">
             <a:extLst>
               <a:ext uri="{FF2B5EF4-FFF2-40B4-BE49-F238E27FC236}">
-                <a16:creationId xmlns:a16="http://schemas.microsoft.com/office/drawing/2014/main" id="{EBBF5FAD-5B93-F5FE-6EC3-B373A4031E21}"/>
+                <a16:creationId xmlns:a16="http://schemas.microsoft.com/office/drawing/2014/main" id="{C1EB44DA-AB91-4139-33D4-6FD46F8EAE64}"/>
               </a:ext>
             </a:extLst>
           </p:cNvPr>
@@ -5286,7 +6595,7 @@
           <a:p>
             <a:r>
               <a:rPr lang="en-US" dirty="0"/>
-              <a:t>Original Text</a:t>
+              <a:t>How the cipher works</a:t>
             </a:r>
           </a:p>
         </p:txBody>
@@ -5296,7 +6605,7 @@
           <p:cNvPr id="3" name="Content Placeholder 2">
             <a:extLst>
               <a:ext uri="{FF2B5EF4-FFF2-40B4-BE49-F238E27FC236}">
-                <a16:creationId xmlns:a16="http://schemas.microsoft.com/office/drawing/2014/main" id="{B3718846-F08B-00DF-068D-154D8B377D9A}"/>
+                <a16:creationId xmlns:a16="http://schemas.microsoft.com/office/drawing/2014/main" id="{09A3564C-FD32-0B42-19AC-2398EB01C143}"/>
               </a:ext>
             </a:extLst>
           </p:cNvPr>
@@ -5309,8 +6618,82 @@
         </p:nvSpPr>
         <p:spPr/>
         <p:txBody>
-          <a:bodyPr/>
+          <a:bodyPr>
+            <a:normAutofit/>
+          </a:bodyPr>
           <a:lstStyle/>
+          <a:p>
+            <a:r>
+              <a:rPr lang="en-US" dirty="0"/>
+              <a:t>Asymmetric Key Delivery – </a:t>
+            </a:r>
+            <a:r>
+              <a:rPr lang="en-US" dirty="0" err="1"/>
+              <a:t>McEliece</a:t>
+            </a:r>
+            <a:endParaRPr lang="en-US" dirty="0"/>
+          </a:p>
+          <a:p>
+            <a:endParaRPr lang="en-US" dirty="0"/>
+          </a:p>
+          <a:p>
+            <a:pPr lvl="1">
+              <a:buFont typeface="Arial" panose="020B0604020202020204" pitchFamily="34" charset="0"/>
+              <a:buChar char="•"/>
+            </a:pPr>
+            <a:r>
+              <a:rPr lang="en-US" dirty="0"/>
+              <a:t>Asymmetric encryption for key delivery</a:t>
+            </a:r>
+          </a:p>
+          <a:p>
+            <a:pPr lvl="1">
+              <a:buFont typeface="Arial" panose="020B0604020202020204" pitchFamily="34" charset="0"/>
+              <a:buChar char="•"/>
+            </a:pPr>
+            <a:r>
+              <a:rPr lang="en-US" dirty="0"/>
+              <a:t>Based on error-correcting codes (</a:t>
+            </a:r>
+            <a:r>
+              <a:rPr lang="en-US" dirty="0" err="1"/>
+              <a:t>Goppa</a:t>
+            </a:r>
+            <a:r>
+              <a:rPr lang="en-US" dirty="0"/>
+              <a:t> codes)</a:t>
+            </a:r>
+          </a:p>
+          <a:p>
+            <a:pPr lvl="1">
+              <a:buFont typeface="Arial" panose="020B0604020202020204" pitchFamily="34" charset="0"/>
+              <a:buChar char="•"/>
+            </a:pPr>
+            <a:r>
+              <a:rPr lang="en-US" dirty="0"/>
+              <a:t>Public key used to encrypt Blowfish key</a:t>
+            </a:r>
+          </a:p>
+          <a:p>
+            <a:pPr lvl="1">
+              <a:buFont typeface="Arial" panose="020B0604020202020204" pitchFamily="34" charset="0"/>
+              <a:buChar char="•"/>
+            </a:pPr>
+            <a:r>
+              <a:rPr lang="en-US" dirty="0"/>
+              <a:t>Private key used by recipient to recover Blowfish key</a:t>
+            </a:r>
+          </a:p>
+          <a:p>
+            <a:pPr lvl="1">
+              <a:buFont typeface="Arial" panose="020B0604020202020204" pitchFamily="34" charset="0"/>
+              <a:buChar char="•"/>
+            </a:pPr>
+            <a:r>
+              <a:rPr lang="en-US" dirty="0"/>
+              <a:t>Resistant to quantum attacks (unlike RSA)</a:t>
+            </a:r>
+          </a:p>
           <a:p>
             <a:endParaRPr lang="en-US" dirty="0"/>
           </a:p>
@@ -5319,7 +6702,7 @@
     </p:spTree>
     <p:extLst>
       <p:ext uri="{BB962C8B-B14F-4D97-AF65-F5344CB8AC3E}">
-        <p14:creationId xmlns:p14="http://schemas.microsoft.com/office/powerpoint/2010/main" val="324050415"/>
+        <p14:creationId xmlns:p14="http://schemas.microsoft.com/office/powerpoint/2010/main" val="3395196265"/>
       </p:ext>
     </p:extLst>
   </p:cSld>
@@ -5351,7 +6734,7 @@
           <p:cNvPr id="2" name="Title 1">
             <a:extLst>
               <a:ext uri="{FF2B5EF4-FFF2-40B4-BE49-F238E27FC236}">
-                <a16:creationId xmlns:a16="http://schemas.microsoft.com/office/drawing/2014/main" id="{064E537F-7CAC-9F01-3D6A-9B05421839AF}"/>
+                <a16:creationId xmlns:a16="http://schemas.microsoft.com/office/drawing/2014/main" id="{EBBF5FAD-5B93-F5FE-6EC3-B373A4031E21}"/>
               </a:ext>
             </a:extLst>
           </p:cNvPr>
@@ -5369,7 +6752,7 @@
           <a:p>
             <a:r>
               <a:rPr lang="en-US" dirty="0"/>
-              <a:t>Encrypted Text</a:t>
+              <a:t>Original Text</a:t>
             </a:r>
           </a:p>
         </p:txBody>
@@ -5379,7 +6762,7 @@
           <p:cNvPr id="3" name="Content Placeholder 2">
             <a:extLst>
               <a:ext uri="{FF2B5EF4-FFF2-40B4-BE49-F238E27FC236}">
-                <a16:creationId xmlns:a16="http://schemas.microsoft.com/office/drawing/2014/main" id="{9C346764-401B-5F17-A636-63CA8110CCBC}"/>
+                <a16:creationId xmlns:a16="http://schemas.microsoft.com/office/drawing/2014/main" id="{B3718846-F08B-00DF-068D-154D8B377D9A}"/>
               </a:ext>
             </a:extLst>
           </p:cNvPr>
@@ -5395,14 +6778,86 @@
           <a:bodyPr/>
           <a:lstStyle/>
           <a:p>
-            <a:endParaRPr lang="en-US"/>
+            <a:pPr>
+              <a:buFont typeface="Arial" panose="020B0604020202020204" pitchFamily="34" charset="0"/>
+              <a:buChar char="•"/>
+            </a:pPr>
+            <a:r>
+              <a:rPr lang="en-US" dirty="0"/>
+              <a:t>Example plaintext message:</a:t>
+            </a:r>
+            <a:br>
+              <a:rPr lang="en-US" dirty="0"/>
+            </a:br>
+            <a:r>
+              <a:rPr lang="en-US" dirty="0"/>
+              <a:t>	“Project X status: Launch delayed until Q3.”</a:t>
+            </a:r>
+          </a:p>
+          <a:p>
+            <a:pPr>
+              <a:buFont typeface="Arial" panose="020B0604020202020204" pitchFamily="34" charset="0"/>
+              <a:buChar char="•"/>
+            </a:pPr>
+            <a:r>
+              <a:rPr lang="en-US" dirty="0"/>
+              <a:t>Message is unprotected in its current form</a:t>
+            </a:r>
+            <a:br>
+              <a:rPr lang="en-US" dirty="0"/>
+            </a:br>
+            <a:r>
+              <a:rPr lang="en-US" dirty="0"/>
+              <a:t>Needs:</a:t>
+            </a:r>
+          </a:p>
+          <a:p>
+            <a:pPr lvl="1">
+              <a:buFont typeface="Arial" panose="020B0604020202020204" pitchFamily="34" charset="0"/>
+              <a:buChar char="•"/>
+            </a:pPr>
+            <a:r>
+              <a:rPr lang="en-US" dirty="0"/>
+              <a:t> Encryption for confidentiality</a:t>
+            </a:r>
+          </a:p>
+          <a:p>
+            <a:pPr lvl="1">
+              <a:buFont typeface="Arial" panose="020B0604020202020204" pitchFamily="34" charset="0"/>
+              <a:buChar char="•"/>
+            </a:pPr>
+            <a:r>
+              <a:rPr lang="en-US" dirty="0"/>
+              <a:t> Digital signature for authenticity</a:t>
+            </a:r>
+          </a:p>
+          <a:p>
+            <a:pPr>
+              <a:buFont typeface="Arial" panose="020B0604020202020204" pitchFamily="34" charset="0"/>
+              <a:buChar char="•"/>
+            </a:pPr>
+            <a:r>
+              <a:rPr lang="en-US" dirty="0"/>
+              <a:t>Processed next using Blowfish, </a:t>
+            </a:r>
+            <a:r>
+              <a:rPr lang="en-US" dirty="0" err="1"/>
+              <a:t>McEliece</a:t>
+            </a:r>
+            <a:r>
+              <a:rPr lang="en-US" dirty="0"/>
+              <a:t>, and ECDSA</a:t>
+            </a:r>
+          </a:p>
+          <a:p>
+            <a:endParaRPr lang="en-US" dirty="0"/>
           </a:p>
         </p:txBody>
       </p:sp>
     </p:spTree>
     <p:extLst>
       <p:ext uri="{BB962C8B-B14F-4D97-AF65-F5344CB8AC3E}">
-        <p14:creationId xmlns:p14="http://schemas.microsoft.com/office/powerpoint/2010/main" val="3549070684"/>
+        <p14:creationId xmlns:p14="http://schemas.microsoft.com/office/powerpoint/2010/main" val="324050415"/>
       </p:ext>
     </p:extLst>
   </p:cSld>
@@ -5434,7 +6889,7 @@
           <p:cNvPr id="2" name="Title 1">
             <a:extLst>
               <a:ext uri="{FF2B5EF4-FFF2-40B4-BE49-F238E27FC236}">
-                <a16:creationId xmlns:a16="http://schemas.microsoft.com/office/drawing/2014/main" id="{7C313ABA-0CD1-864A-C658-376BE54E099A}"/>
+                <a16:creationId xmlns:a16="http://schemas.microsoft.com/office/drawing/2014/main" id="{064E537F-7CAC-9F01-3D6A-9B05421839AF}"/>
               </a:ext>
             </a:extLst>
           </p:cNvPr>
@@ -5452,7 +6907,7 @@
           <a:p>
             <a:r>
               <a:rPr lang="en-US" dirty="0"/>
-              <a:t>How to decipher with the key</a:t>
+              <a:t>Encrypted Text</a:t>
             </a:r>
           </a:p>
         </p:txBody>
@@ -5462,7 +6917,7 @@
           <p:cNvPr id="3" name="Content Placeholder 2">
             <a:extLst>
               <a:ext uri="{FF2B5EF4-FFF2-40B4-BE49-F238E27FC236}">
-                <a16:creationId xmlns:a16="http://schemas.microsoft.com/office/drawing/2014/main" id="{4441DE8B-3BFF-25A7-C22F-17EA37DCE609}"/>
+                <a16:creationId xmlns:a16="http://schemas.microsoft.com/office/drawing/2014/main" id="{9C346764-401B-5F17-A636-63CA8110CCBC}"/>
               </a:ext>
             </a:extLst>
           </p:cNvPr>
@@ -5478,14 +6933,113 @@
           <a:bodyPr/>
           <a:lstStyle/>
           <a:p>
-            <a:endParaRPr lang="en-US"/>
+            <a:pPr>
+              <a:buFont typeface="Arial" panose="020B0604020202020204" pitchFamily="34" charset="0"/>
+              <a:buChar char="•"/>
+            </a:pPr>
+            <a:r>
+              <a:rPr lang="he-IL" dirty="0"/>
+              <a:t> </a:t>
+            </a:r>
+            <a:r>
+              <a:rPr lang="en-US" b="1" dirty="0"/>
+              <a:t>Message encrypted using Blowfish cipher</a:t>
+            </a:r>
+            <a:endParaRPr lang="en-US" dirty="0"/>
+          </a:p>
+          <a:p>
+            <a:pPr>
+              <a:buFont typeface="Arial" panose="020B0604020202020204" pitchFamily="34" charset="0"/>
+              <a:buChar char="•"/>
+            </a:pPr>
+            <a:r>
+              <a:rPr lang="he-IL" dirty="0"/>
+              <a:t> </a:t>
+            </a:r>
+            <a:r>
+              <a:rPr lang="en-US" dirty="0"/>
+              <a:t>Uses a </a:t>
+            </a:r>
+            <a:r>
+              <a:rPr lang="en-US" b="1" dirty="0"/>
+              <a:t>randomly generated symmetric key</a:t>
+            </a:r>
+            <a:endParaRPr lang="en-US" dirty="0"/>
+          </a:p>
+          <a:p>
+            <a:pPr>
+              <a:buFont typeface="Arial" panose="020B0604020202020204" pitchFamily="34" charset="0"/>
+              <a:buChar char="•"/>
+            </a:pPr>
+            <a:r>
+              <a:rPr lang="he-IL" dirty="0"/>
+              <a:t> </a:t>
+            </a:r>
+            <a:r>
+              <a:rPr lang="en-US" b="1" dirty="0"/>
+              <a:t>Output is ciphertext</a:t>
+            </a:r>
+            <a:r>
+              <a:rPr lang="en-US" dirty="0"/>
+              <a:t>: unreadable without the correct key</a:t>
+            </a:r>
+          </a:p>
+          <a:p>
+            <a:pPr>
+              <a:buFont typeface="Arial" panose="020B0604020202020204" pitchFamily="34" charset="0"/>
+              <a:buChar char="•"/>
+            </a:pPr>
+            <a:r>
+              <a:rPr lang="he-IL" dirty="0"/>
+              <a:t> </a:t>
+            </a:r>
+            <a:r>
+              <a:rPr lang="en-US" dirty="0"/>
+              <a:t>Appears as random data (e.g., hexadecimal or base64)</a:t>
+            </a:r>
+          </a:p>
+          <a:p>
+            <a:pPr>
+              <a:buFont typeface="Arial" panose="020B0604020202020204" pitchFamily="34" charset="0"/>
+              <a:buChar char="•"/>
+            </a:pPr>
+            <a:r>
+              <a:rPr lang="he-IL" dirty="0"/>
+              <a:t> </a:t>
+            </a:r>
+            <a:r>
+              <a:rPr lang="en-US" dirty="0"/>
+              <a:t>Blowfish key will be securely sent using </a:t>
+            </a:r>
+            <a:r>
+              <a:rPr lang="en-US" b="1" dirty="0" err="1"/>
+              <a:t>McEliece</a:t>
+            </a:r>
+            <a:endParaRPr lang="en-US" dirty="0"/>
+          </a:p>
+          <a:p>
+            <a:pPr>
+              <a:buFont typeface="Arial" panose="020B0604020202020204" pitchFamily="34" charset="0"/>
+              <a:buChar char="•"/>
+            </a:pPr>
+            <a:r>
+              <a:rPr lang="he-IL" dirty="0"/>
+              <a:t> </a:t>
+            </a:r>
+            <a:r>
+              <a:rPr lang="en-US" dirty="0"/>
+              <a:t>Protects message confidentiality in transit</a:t>
+            </a:r>
+          </a:p>
+          <a:p>
+            <a:endParaRPr lang="en-US" dirty="0"/>
           </a:p>
         </p:txBody>
       </p:sp>
     </p:spTree>
     <p:extLst>
       <p:ext uri="{BB962C8B-B14F-4D97-AF65-F5344CB8AC3E}">
-        <p14:creationId xmlns:p14="http://schemas.microsoft.com/office/powerpoint/2010/main" val="351153011"/>
+        <p14:creationId xmlns:p14="http://schemas.microsoft.com/office/powerpoint/2010/main" val="3549070684"/>
       </p:ext>
     </p:extLst>
   </p:cSld>
@@ -5517,7 +7071,7 @@
           <p:cNvPr id="2" name="Title 1">
             <a:extLst>
               <a:ext uri="{FF2B5EF4-FFF2-40B4-BE49-F238E27FC236}">
-                <a16:creationId xmlns:a16="http://schemas.microsoft.com/office/drawing/2014/main" id="{0A8D517A-27A8-A120-4438-2C1E3CD6C6B4}"/>
+                <a16:creationId xmlns:a16="http://schemas.microsoft.com/office/drawing/2014/main" id="{7C313ABA-0CD1-864A-C658-376BE54E099A}"/>
               </a:ext>
             </a:extLst>
           </p:cNvPr>
@@ -5535,7 +7089,7 @@
           <a:p>
             <a:r>
               <a:rPr lang="en-US" dirty="0"/>
-              <a:t>Digital Signature</a:t>
+              <a:t>How to decipher with the key</a:t>
             </a:r>
           </a:p>
         </p:txBody>
@@ -5545,7 +7099,7 @@
           <p:cNvPr id="3" name="Content Placeholder 2">
             <a:extLst>
               <a:ext uri="{FF2B5EF4-FFF2-40B4-BE49-F238E27FC236}">
-                <a16:creationId xmlns:a16="http://schemas.microsoft.com/office/drawing/2014/main" id="{2DB43414-874A-CEEC-633F-C905E23E4C10}"/>
+                <a16:creationId xmlns:a16="http://schemas.microsoft.com/office/drawing/2014/main" id="{4441DE8B-3BFF-25A7-C22F-17EA37DCE609}"/>
               </a:ext>
             </a:extLst>
           </p:cNvPr>
@@ -5558,17 +7112,178 @@
         </p:nvSpPr>
         <p:spPr/>
         <p:txBody>
-          <a:bodyPr/>
+          <a:bodyPr>
+            <a:normAutofit fontScale="92500" lnSpcReduction="10000"/>
+          </a:bodyPr>
           <a:lstStyle/>
           <a:p>
-            <a:endParaRPr lang="en-US"/>
+            <a:pPr>
+              <a:buFont typeface="Arial" panose="020B0604020202020204" pitchFamily="34" charset="0"/>
+              <a:buChar char="•"/>
+            </a:pPr>
+            <a:r>
+              <a:rPr lang="he-IL" dirty="0"/>
+              <a:t> </a:t>
+            </a:r>
+            <a:r>
+              <a:rPr lang="en-US" dirty="0"/>
+              <a:t>Receiver (Bob) receives:</a:t>
+            </a:r>
+          </a:p>
+          <a:p>
+            <a:pPr marL="742950" lvl="1" indent="-285750">
+              <a:buFont typeface="Arial" panose="020B0604020202020204" pitchFamily="34" charset="0"/>
+              <a:buChar char="•"/>
+            </a:pPr>
+            <a:r>
+              <a:rPr lang="en-US" dirty="0"/>
+              <a:t>Encrypted message (ciphertext)</a:t>
+            </a:r>
+          </a:p>
+          <a:p>
+            <a:pPr marL="742950" lvl="1" indent="-285750">
+              <a:buFont typeface="Arial" panose="020B0604020202020204" pitchFamily="34" charset="0"/>
+              <a:buChar char="•"/>
+            </a:pPr>
+            <a:r>
+              <a:rPr lang="en-US" dirty="0"/>
+              <a:t>Encrypted Blowfish key</a:t>
+            </a:r>
+          </a:p>
+          <a:p>
+            <a:pPr marL="742950" lvl="1" indent="-285750">
+              <a:buFont typeface="Arial" panose="020B0604020202020204" pitchFamily="34" charset="0"/>
+              <a:buChar char="•"/>
+            </a:pPr>
+            <a:r>
+              <a:rPr lang="en-US" dirty="0"/>
+              <a:t>Digital signature</a:t>
+            </a:r>
+          </a:p>
+          <a:p>
+            <a:pPr marL="742950" lvl="1" indent="-285750">
+              <a:buFont typeface="Arial" panose="020B0604020202020204" pitchFamily="34" charset="0"/>
+              <a:buChar char="•"/>
+            </a:pPr>
+            <a:r>
+              <a:rPr lang="en-US" dirty="0"/>
+              <a:t>Sender’s public ECDSA key</a:t>
+            </a:r>
+          </a:p>
+          <a:p>
+            <a:pPr>
+              <a:buFont typeface="Arial" panose="020B0604020202020204" pitchFamily="34" charset="0"/>
+              <a:buChar char="•"/>
+            </a:pPr>
+            <a:r>
+              <a:rPr lang="he-IL" dirty="0"/>
+              <a:t> </a:t>
+            </a:r>
+            <a:r>
+              <a:rPr lang="en-US" b="1" dirty="0"/>
+              <a:t>Step 1: Decrypt Blowfish key</a:t>
+            </a:r>
+            <a:endParaRPr lang="en-US" dirty="0"/>
+          </a:p>
+          <a:p>
+            <a:pPr marL="742950" lvl="1" indent="-285750">
+              <a:buFont typeface="Arial" panose="020B0604020202020204" pitchFamily="34" charset="0"/>
+              <a:buChar char="•"/>
+            </a:pPr>
+            <a:r>
+              <a:rPr lang="en-US" dirty="0"/>
+              <a:t>Use </a:t>
+            </a:r>
+            <a:r>
+              <a:rPr lang="en-US" dirty="0" err="1"/>
+              <a:t>McEliece</a:t>
+            </a:r>
+            <a:r>
+              <a:rPr lang="en-US" dirty="0"/>
+              <a:t> </a:t>
+            </a:r>
+            <a:r>
+              <a:rPr lang="en-US" b="1" dirty="0"/>
+              <a:t>private key</a:t>
+            </a:r>
+            <a:r>
+              <a:rPr lang="en-US" dirty="0"/>
+              <a:t> to recover the symmetric Blowfish key</a:t>
+            </a:r>
+          </a:p>
+          <a:p>
+            <a:pPr>
+              <a:buFont typeface="Arial" panose="020B0604020202020204" pitchFamily="34" charset="0"/>
+              <a:buChar char="•"/>
+            </a:pPr>
+            <a:r>
+              <a:rPr lang="he-IL" dirty="0"/>
+              <a:t> </a:t>
+            </a:r>
+            <a:r>
+              <a:rPr lang="en-US" b="1" dirty="0"/>
+              <a:t>Step 2: Decrypt the message</a:t>
+            </a:r>
+            <a:endParaRPr lang="en-US" dirty="0"/>
+          </a:p>
+          <a:p>
+            <a:pPr marL="742950" lvl="1" indent="-285750">
+              <a:buFont typeface="Arial" panose="020B0604020202020204" pitchFamily="34" charset="0"/>
+              <a:buChar char="•"/>
+            </a:pPr>
+            <a:r>
+              <a:rPr lang="en-US" dirty="0"/>
+              <a:t>Use the recovered Blowfish key to decrypt the message</a:t>
+            </a:r>
+          </a:p>
+          <a:p>
+            <a:pPr>
+              <a:buFont typeface="Arial" panose="020B0604020202020204" pitchFamily="34" charset="0"/>
+              <a:buChar char="•"/>
+            </a:pPr>
+            <a:r>
+              <a:rPr lang="he-IL" dirty="0"/>
+              <a:t> </a:t>
+            </a:r>
+            <a:r>
+              <a:rPr lang="en-US" b="1" dirty="0"/>
+              <a:t>Step 3: Verify the signature</a:t>
+            </a:r>
+            <a:endParaRPr lang="en-US" dirty="0"/>
+          </a:p>
+          <a:p>
+            <a:pPr marL="742950" lvl="1" indent="-285750">
+              <a:buFont typeface="Arial" panose="020B0604020202020204" pitchFamily="34" charset="0"/>
+              <a:buChar char="•"/>
+            </a:pPr>
+            <a:r>
+              <a:rPr lang="en-US" dirty="0"/>
+              <a:t>Use sender’s public ECDSA key to confirm message authenticity</a:t>
+            </a:r>
+          </a:p>
+          <a:p>
+            <a:pPr>
+              <a:buFont typeface="Arial" panose="020B0604020202020204" pitchFamily="34" charset="0"/>
+              <a:buChar char="•"/>
+            </a:pPr>
+            <a:r>
+              <a:rPr lang="he-IL" dirty="0"/>
+              <a:t> </a:t>
+            </a:r>
+            <a:r>
+              <a:rPr lang="en-US" dirty="0"/>
+              <a:t>Message is only accepted if signature is valid</a:t>
+            </a:r>
+          </a:p>
+          <a:p>
+            <a:endParaRPr lang="en-US" dirty="0"/>
           </a:p>
         </p:txBody>
       </p:sp>
     </p:spTree>
     <p:extLst>
       <p:ext uri="{BB962C8B-B14F-4D97-AF65-F5344CB8AC3E}">
-        <p14:creationId xmlns:p14="http://schemas.microsoft.com/office/powerpoint/2010/main" val="486978243"/>
+        <p14:creationId xmlns:p14="http://schemas.microsoft.com/office/powerpoint/2010/main" val="351153011"/>
       </p:ext>
     </p:extLst>
   </p:cSld>
@@ -5600,7 +7315,7 @@
           <p:cNvPr id="2" name="Title 1">
             <a:extLst>
               <a:ext uri="{FF2B5EF4-FFF2-40B4-BE49-F238E27FC236}">
-                <a16:creationId xmlns:a16="http://schemas.microsoft.com/office/drawing/2014/main" id="{47F36288-342E-EA10-AA37-F42658EB062E}"/>
+                <a16:creationId xmlns:a16="http://schemas.microsoft.com/office/drawing/2014/main" id="{0A8D517A-27A8-A120-4438-2C1E3CD6C6B4}"/>
               </a:ext>
             </a:extLst>
           </p:cNvPr>
@@ -5618,7 +7333,7 @@
           <a:p>
             <a:r>
               <a:rPr lang="en-US" dirty="0"/>
-              <a:t>Hash Function</a:t>
+              <a:t>Digital Signature</a:t>
             </a:r>
           </a:p>
         </p:txBody>
@@ -5628,7 +7343,7 @@
           <p:cNvPr id="3" name="Content Placeholder 2">
             <a:extLst>
               <a:ext uri="{FF2B5EF4-FFF2-40B4-BE49-F238E27FC236}">
-                <a16:creationId xmlns:a16="http://schemas.microsoft.com/office/drawing/2014/main" id="{4A87D67E-2A13-CFBE-7FA0-777A7BA2D861}"/>
+                <a16:creationId xmlns:a16="http://schemas.microsoft.com/office/drawing/2014/main" id="{2DB43414-874A-CEEC-633F-C905E23E4C10}"/>
               </a:ext>
             </a:extLst>
           </p:cNvPr>
@@ -5644,14 +7359,273 @@
           <a:bodyPr/>
           <a:lstStyle/>
           <a:p>
-            <a:endParaRPr lang="en-US"/>
+            <a:pPr>
+              <a:buNone/>
+            </a:pPr>
+            <a:r>
+              <a:rPr lang="en-US" b="1" dirty="0"/>
+              <a:t>Bullet Points (for slide content)</a:t>
+            </a:r>
+          </a:p>
+          <a:p>
+            <a:pPr>
+              <a:buFont typeface="Arial" panose="020B0604020202020204" pitchFamily="34" charset="0"/>
+              <a:buChar char="•"/>
+            </a:pPr>
+            <a:r>
+              <a:rPr lang="en-US" dirty="0"/>
+              <a:t> Ensures the message came from the claimed sender</a:t>
+            </a:r>
+          </a:p>
+          <a:p>
+            <a:pPr>
+              <a:buFont typeface="Arial" panose="020B0604020202020204" pitchFamily="34" charset="0"/>
+              <a:buChar char="•"/>
+            </a:pPr>
+            <a:r>
+              <a:rPr lang="en-US" dirty="0"/>
+              <a:t> Confirms the message hasn’t been altered</a:t>
+            </a:r>
+          </a:p>
+          <a:p>
+            <a:pPr>
+              <a:buFont typeface="Arial" panose="020B0604020202020204" pitchFamily="34" charset="0"/>
+              <a:buChar char="•"/>
+            </a:pPr>
+            <a:r>
+              <a:rPr lang="en-US" dirty="0"/>
+              <a:t> Signature is created with sender’s private key</a:t>
+            </a:r>
+          </a:p>
+          <a:p>
+            <a:pPr>
+              <a:buFont typeface="Arial" panose="020B0604020202020204" pitchFamily="34" charset="0"/>
+              <a:buChar char="•"/>
+            </a:pPr>
+            <a:r>
+              <a:rPr lang="en-US" dirty="0"/>
+              <a:t> Verified using sender’s public key</a:t>
+            </a:r>
+          </a:p>
+          <a:p>
+            <a:pPr>
+              <a:buFont typeface="Arial" panose="020B0604020202020204" pitchFamily="34" charset="0"/>
+              <a:buChar char="•"/>
+            </a:pPr>
+            <a:r>
+              <a:rPr lang="en-US" dirty="0"/>
+              <a:t> Applied to the </a:t>
+            </a:r>
+            <a:r>
+              <a:rPr lang="en-US" b="1" dirty="0"/>
+              <a:t>encrypted message</a:t>
+            </a:r>
+            <a:r>
+              <a:rPr lang="en-US" dirty="0"/>
+              <a:t>, not the plaintext</a:t>
+            </a:r>
           </a:p>
         </p:txBody>
       </p:sp>
     </p:spTree>
     <p:extLst>
       <p:ext uri="{BB962C8B-B14F-4D97-AF65-F5344CB8AC3E}">
-        <p14:creationId xmlns:p14="http://schemas.microsoft.com/office/powerpoint/2010/main" val="2492103625"/>
+        <p14:creationId xmlns:p14="http://schemas.microsoft.com/office/powerpoint/2010/main" val="486978243"/>
+      </p:ext>
+    </p:extLst>
+  </p:cSld>
+  <p:clrMapOvr>
+    <a:masterClrMapping/>
+  </p:clrMapOvr>
+</p:sld>
+</file>
+
+<file path=ppt/slides/slide9.xml><?xml version="1.0" encoding="utf-8"?>
+<p:sld xmlns:a="http://schemas.openxmlformats.org/drawingml/2006/main" xmlns:r="http://schemas.openxmlformats.org/officeDocument/2006/relationships" xmlns:p="http://schemas.openxmlformats.org/presentationml/2006/main">
+  <p:cSld>
+    <p:spTree>
+      <p:nvGrpSpPr>
+        <p:cNvPr id="1" name="">
+          <a:extLst>
+            <a:ext uri="{FF2B5EF4-FFF2-40B4-BE49-F238E27FC236}">
+              <a16:creationId xmlns:a16="http://schemas.microsoft.com/office/drawing/2014/main" id="{1580CB9A-FD1D-7F96-ED77-A6A6E06550CF}"/>
+            </a:ext>
+          </a:extLst>
+        </p:cNvPr>
+        <p:cNvGrpSpPr/>
+        <p:nvPr/>
+      </p:nvGrpSpPr>
+      <p:grpSpPr>
+        <a:xfrm>
+          <a:off x="0" y="0"/>
+          <a:ext cx="0" cy="0"/>
+          <a:chOff x="0" y="0"/>
+          <a:chExt cx="0" cy="0"/>
+        </a:xfrm>
+      </p:grpSpPr>
+      <p:sp>
+        <p:nvSpPr>
+          <p:cNvPr id="2" name="Title 1">
+            <a:extLst>
+              <a:ext uri="{FF2B5EF4-FFF2-40B4-BE49-F238E27FC236}">
+                <a16:creationId xmlns:a16="http://schemas.microsoft.com/office/drawing/2014/main" id="{9FB7E976-1C44-96A6-F1EC-23C4865A0A5E}"/>
+              </a:ext>
+            </a:extLst>
+          </p:cNvPr>
+          <p:cNvSpPr>
+            <a:spLocks noGrp="1"/>
+          </p:cNvSpPr>
+          <p:nvPr>
+            <p:ph type="title"/>
+          </p:nvPr>
+        </p:nvSpPr>
+        <p:spPr/>
+        <p:txBody>
+          <a:bodyPr/>
+          <a:lstStyle/>
+          <a:p>
+            <a:r>
+              <a:rPr lang="en-US" dirty="0"/>
+              <a:t>Digital Signature</a:t>
+            </a:r>
+          </a:p>
+        </p:txBody>
+      </p:sp>
+      <p:sp>
+        <p:nvSpPr>
+          <p:cNvPr id="3" name="Content Placeholder 2">
+            <a:extLst>
+              <a:ext uri="{FF2B5EF4-FFF2-40B4-BE49-F238E27FC236}">
+                <a16:creationId xmlns:a16="http://schemas.microsoft.com/office/drawing/2014/main" id="{B4A2BB60-7138-F637-CE31-61A73404F1A8}"/>
+              </a:ext>
+            </a:extLst>
+          </p:cNvPr>
+          <p:cNvSpPr>
+            <a:spLocks noGrp="1"/>
+          </p:cNvSpPr>
+          <p:nvPr>
+            <p:ph idx="1"/>
+          </p:nvPr>
+        </p:nvSpPr>
+        <p:spPr/>
+        <p:txBody>
+          <a:bodyPr/>
+          <a:lstStyle/>
+          <a:p>
+            <a:pPr>
+              <a:buFont typeface="Arial" panose="020B0604020202020204" pitchFamily="34" charset="0"/>
+              <a:buChar char="•"/>
+            </a:pPr>
+            <a:r>
+              <a:rPr lang="en-US" dirty="0"/>
+              <a:t> </a:t>
+            </a:r>
+            <a:r>
+              <a:rPr lang="en-US" b="1" dirty="0"/>
+              <a:t>Based on elliptic curve cryptography</a:t>
+            </a:r>
+            <a:endParaRPr lang="en-US" dirty="0"/>
+          </a:p>
+          <a:p>
+            <a:pPr>
+              <a:buFont typeface="Arial" panose="020B0604020202020204" pitchFamily="34" charset="0"/>
+              <a:buChar char="•"/>
+            </a:pPr>
+            <a:r>
+              <a:rPr lang="en-US" dirty="0"/>
+              <a:t> Uses a </a:t>
+            </a:r>
+            <a:r>
+              <a:rPr lang="en-US" b="1" dirty="0"/>
+              <a:t>private key</a:t>
+            </a:r>
+            <a:r>
+              <a:rPr lang="en-US" dirty="0"/>
+              <a:t> to create a signature</a:t>
+            </a:r>
+          </a:p>
+          <a:p>
+            <a:pPr>
+              <a:buFont typeface="Arial" panose="020B0604020202020204" pitchFamily="34" charset="0"/>
+              <a:buChar char="•"/>
+            </a:pPr>
+            <a:r>
+              <a:rPr lang="en-US" dirty="0"/>
+              <a:t> Uses the </a:t>
+            </a:r>
+            <a:r>
+              <a:rPr lang="en-US" b="1" dirty="0"/>
+              <a:t>corresponding public key</a:t>
+            </a:r>
+            <a:r>
+              <a:rPr lang="en-US" dirty="0"/>
+              <a:t> to verify it</a:t>
+            </a:r>
+          </a:p>
+          <a:p>
+            <a:pPr>
+              <a:buFont typeface="Arial" panose="020B0604020202020204" pitchFamily="34" charset="0"/>
+              <a:buChar char="•"/>
+            </a:pPr>
+            <a:r>
+              <a:rPr lang="en-US" dirty="0"/>
+              <a:t> Two main steps:</a:t>
+            </a:r>
+          </a:p>
+          <a:p>
+            <a:pPr marL="742950" lvl="1" indent="-285750">
+              <a:buFont typeface="Arial" panose="020B0604020202020204" pitchFamily="34" charset="0"/>
+              <a:buChar char="•"/>
+            </a:pPr>
+            <a:r>
+              <a:rPr lang="en-US" b="1" dirty="0"/>
+              <a:t>Signing</a:t>
+            </a:r>
+            <a:r>
+              <a:rPr lang="en-US" dirty="0"/>
+              <a:t>: Hash the message + generate signature using private key</a:t>
+            </a:r>
+          </a:p>
+          <a:p>
+            <a:pPr marL="742950" lvl="1" indent="-285750">
+              <a:buFont typeface="Arial" panose="020B0604020202020204" pitchFamily="34" charset="0"/>
+              <a:buChar char="•"/>
+            </a:pPr>
+            <a:r>
+              <a:rPr lang="en-US" b="1" dirty="0"/>
+              <a:t>Verification</a:t>
+            </a:r>
+            <a:r>
+              <a:rPr lang="en-US" dirty="0"/>
+              <a:t>: Use public key to verify that signature matches hash</a:t>
+            </a:r>
+          </a:p>
+          <a:p>
+            <a:pPr>
+              <a:buFont typeface="Arial" panose="020B0604020202020204" pitchFamily="34" charset="0"/>
+              <a:buChar char="•"/>
+            </a:pPr>
+            <a:r>
+              <a:rPr lang="en-US" dirty="0"/>
+              <a:t> If matched: signature is valid → message is authentic</a:t>
+            </a:r>
+          </a:p>
+          <a:p>
+            <a:pPr>
+              <a:buFont typeface="Arial" panose="020B0604020202020204" pitchFamily="34" charset="0"/>
+              <a:buChar char="•"/>
+            </a:pPr>
+            <a:r>
+              <a:rPr lang="en-US" dirty="0"/>
+              <a:t> If mismatch: reject message → possible tampering</a:t>
+            </a:r>
+          </a:p>
+        </p:txBody>
+      </p:sp>
+    </p:spTree>
+    <p:extLst>
+      <p:ext uri="{BB962C8B-B14F-4D97-AF65-F5344CB8AC3E}">
+        <p14:creationId xmlns:p14="http://schemas.microsoft.com/office/powerpoint/2010/main" val="97106039"/>
       </p:ext>
     </p:extLst>
   </p:cSld>

</xml_diff>